<commit_message>
added all the power point picture source files
</commit_message>
<xml_diff>
--- a/graphics/control_law_trajectories.pptx
+++ b/graphics/control_law_trajectories.pptx
@@ -261,7 +261,7 @@
           <a:p>
             <a:fld id="{71482214-465D-43C6-99A6-44DC602198D4}" type="datetimeFigureOut">
               <a:rPr lang="en-GB" smtClean="0"/>
-              <a:t>14/01/2019</a:t>
+              <a:t>15/01/2019</a:t>
             </a:fld>
             <a:endParaRPr lang="en-GB"/>
           </a:p>
@@ -461,7 +461,7 @@
           <a:p>
             <a:fld id="{71482214-465D-43C6-99A6-44DC602198D4}" type="datetimeFigureOut">
               <a:rPr lang="en-GB" smtClean="0"/>
-              <a:t>14/01/2019</a:t>
+              <a:t>15/01/2019</a:t>
             </a:fld>
             <a:endParaRPr lang="en-GB"/>
           </a:p>
@@ -671,7 +671,7 @@
           <a:p>
             <a:fld id="{71482214-465D-43C6-99A6-44DC602198D4}" type="datetimeFigureOut">
               <a:rPr lang="en-GB" smtClean="0"/>
-              <a:t>14/01/2019</a:t>
+              <a:t>15/01/2019</a:t>
             </a:fld>
             <a:endParaRPr lang="en-GB"/>
           </a:p>
@@ -871,7 +871,7 @@
           <a:p>
             <a:fld id="{71482214-465D-43C6-99A6-44DC602198D4}" type="datetimeFigureOut">
               <a:rPr lang="en-GB" smtClean="0"/>
-              <a:t>14/01/2019</a:t>
+              <a:t>15/01/2019</a:t>
             </a:fld>
             <a:endParaRPr lang="en-GB"/>
           </a:p>
@@ -1147,7 +1147,7 @@
           <a:p>
             <a:fld id="{71482214-465D-43C6-99A6-44DC602198D4}" type="datetimeFigureOut">
               <a:rPr lang="en-GB" smtClean="0"/>
-              <a:t>14/01/2019</a:t>
+              <a:t>15/01/2019</a:t>
             </a:fld>
             <a:endParaRPr lang="en-GB"/>
           </a:p>
@@ -1415,7 +1415,7 @@
           <a:p>
             <a:fld id="{71482214-465D-43C6-99A6-44DC602198D4}" type="datetimeFigureOut">
               <a:rPr lang="en-GB" smtClean="0"/>
-              <a:t>14/01/2019</a:t>
+              <a:t>15/01/2019</a:t>
             </a:fld>
             <a:endParaRPr lang="en-GB"/>
           </a:p>
@@ -1830,7 +1830,7 @@
           <a:p>
             <a:fld id="{71482214-465D-43C6-99A6-44DC602198D4}" type="datetimeFigureOut">
               <a:rPr lang="en-GB" smtClean="0"/>
-              <a:t>14/01/2019</a:t>
+              <a:t>15/01/2019</a:t>
             </a:fld>
             <a:endParaRPr lang="en-GB"/>
           </a:p>
@@ -1972,7 +1972,7 @@
           <a:p>
             <a:fld id="{71482214-465D-43C6-99A6-44DC602198D4}" type="datetimeFigureOut">
               <a:rPr lang="en-GB" smtClean="0"/>
-              <a:t>14/01/2019</a:t>
+              <a:t>15/01/2019</a:t>
             </a:fld>
             <a:endParaRPr lang="en-GB"/>
           </a:p>
@@ -2085,7 +2085,7 @@
           <a:p>
             <a:fld id="{71482214-465D-43C6-99A6-44DC602198D4}" type="datetimeFigureOut">
               <a:rPr lang="en-GB" smtClean="0"/>
-              <a:t>14/01/2019</a:t>
+              <a:t>15/01/2019</a:t>
             </a:fld>
             <a:endParaRPr lang="en-GB"/>
           </a:p>
@@ -2398,7 +2398,7 @@
           <a:p>
             <a:fld id="{71482214-465D-43C6-99A6-44DC602198D4}" type="datetimeFigureOut">
               <a:rPr lang="en-GB" smtClean="0"/>
-              <a:t>14/01/2019</a:t>
+              <a:t>15/01/2019</a:t>
             </a:fld>
             <a:endParaRPr lang="en-GB"/>
           </a:p>
@@ -2687,7 +2687,7 @@
           <a:p>
             <a:fld id="{71482214-465D-43C6-99A6-44DC602198D4}" type="datetimeFigureOut">
               <a:rPr lang="en-GB" smtClean="0"/>
-              <a:t>14/01/2019</a:t>
+              <a:t>15/01/2019</a:t>
             </a:fld>
             <a:endParaRPr lang="en-GB"/>
           </a:p>
@@ -2930,7 +2930,7 @@
           <a:p>
             <a:fld id="{71482214-465D-43C6-99A6-44DC602198D4}" type="datetimeFigureOut">
               <a:rPr lang="en-GB" smtClean="0"/>
-              <a:t>14/01/2019</a:t>
+              <a:t>15/01/2019</a:t>
             </a:fld>
             <a:endParaRPr lang="en-GB"/>
           </a:p>
@@ -3825,8 +3825,8 @@
           </a:p>
         </p:txBody>
       </p:sp>
-      <mc:AlternateContent xmlns:mc="http://schemas.openxmlformats.org/markup-compatibility/2006">
-        <mc:Choice xmlns:a14="http://schemas.microsoft.com/office/drawing/2010/main" Requires="a14">
+      <mc:AlternateContent xmlns:mc="http://schemas.openxmlformats.org/markup-compatibility/2006" xmlns:a14="http://schemas.microsoft.com/office/drawing/2010/main">
+        <mc:Choice Requires="a14">
           <p:sp>
             <p:nvSpPr>
               <p:cNvPr id="28" name="TextBox 27">
@@ -3964,7 +3964,7 @@
             </p:txBody>
           </p:sp>
         </mc:Choice>
-        <mc:Fallback>
+        <mc:Fallback xmlns="">
           <p:sp>
             <p:nvSpPr>
               <p:cNvPr id="28" name="TextBox 27">
@@ -5166,8 +5166,8 @@
           </a:p>
         </p:txBody>
       </p:sp>
-      <mc:AlternateContent xmlns:mc="http://schemas.openxmlformats.org/markup-compatibility/2006">
-        <mc:Choice xmlns:a14="http://schemas.microsoft.com/office/drawing/2010/main" Requires="a14">
+      <mc:AlternateContent xmlns:mc="http://schemas.openxmlformats.org/markup-compatibility/2006" xmlns:a14="http://schemas.microsoft.com/office/drawing/2010/main">
+        <mc:Choice Requires="a14">
           <p:sp>
             <p:nvSpPr>
               <p:cNvPr id="39" name="TextBox 38">
@@ -5236,7 +5236,7 @@
             </p:txBody>
           </p:sp>
         </mc:Choice>
-        <mc:Fallback>
+        <mc:Fallback xmlns="">
           <p:sp>
             <p:nvSpPr>
               <p:cNvPr id="39" name="TextBox 38">
@@ -5281,8 +5281,8 @@
           </p:sp>
         </mc:Fallback>
       </mc:AlternateContent>
-      <mc:AlternateContent xmlns:mc="http://schemas.openxmlformats.org/markup-compatibility/2006">
-        <mc:Choice xmlns:a14="http://schemas.microsoft.com/office/drawing/2010/main" Requires="a14">
+      <mc:AlternateContent xmlns:mc="http://schemas.openxmlformats.org/markup-compatibility/2006" xmlns:a14="http://schemas.microsoft.com/office/drawing/2010/main">
+        <mc:Choice Requires="a14">
           <p:sp>
             <p:nvSpPr>
               <p:cNvPr id="41" name="TextBox 40">
@@ -5332,7 +5332,7 @@
             </p:txBody>
           </p:sp>
         </mc:Choice>
-        <mc:Fallback>
+        <mc:Fallback xmlns="">
           <p:sp>
             <p:nvSpPr>
               <p:cNvPr id="41" name="TextBox 40">
@@ -5377,8 +5377,8 @@
           </p:sp>
         </mc:Fallback>
       </mc:AlternateContent>
-      <mc:AlternateContent xmlns:mc="http://schemas.openxmlformats.org/markup-compatibility/2006">
-        <mc:Choice xmlns:a14="http://schemas.microsoft.com/office/drawing/2010/main" Requires="a14">
+      <mc:AlternateContent xmlns:mc="http://schemas.openxmlformats.org/markup-compatibility/2006" xmlns:a14="http://schemas.microsoft.com/office/drawing/2010/main">
+        <mc:Choice Requires="a14">
           <p:sp>
             <p:nvSpPr>
               <p:cNvPr id="44" name="TextBox 43">
@@ -5428,7 +5428,7 @@
             </p:txBody>
           </p:sp>
         </mc:Choice>
-        <mc:Fallback>
+        <mc:Fallback xmlns="">
           <p:sp>
             <p:nvSpPr>
               <p:cNvPr id="44" name="TextBox 43">
@@ -5681,8 +5681,8 @@
           </a:p>
         </p:txBody>
       </p:sp>
-      <mc:AlternateContent xmlns:mc="http://schemas.openxmlformats.org/markup-compatibility/2006">
-        <mc:Choice xmlns:a14="http://schemas.microsoft.com/office/drawing/2010/main" Requires="a14">
+      <mc:AlternateContent xmlns:mc="http://schemas.openxmlformats.org/markup-compatibility/2006" xmlns:a14="http://schemas.microsoft.com/office/drawing/2010/main">
+        <mc:Choice Requires="a14">
           <p:sp>
             <p:nvSpPr>
               <p:cNvPr id="53" name="TextBox 52">
@@ -5751,7 +5751,7 @@
             </p:txBody>
           </p:sp>
         </mc:Choice>
-        <mc:Fallback>
+        <mc:Fallback xmlns="">
           <p:sp>
             <p:nvSpPr>
               <p:cNvPr id="53" name="TextBox 52">
@@ -5796,8 +5796,8 @@
           </p:sp>
         </mc:Fallback>
       </mc:AlternateContent>
-      <mc:AlternateContent xmlns:mc="http://schemas.openxmlformats.org/markup-compatibility/2006">
-        <mc:Choice xmlns:a14="http://schemas.microsoft.com/office/drawing/2010/main" Requires="a14">
+      <mc:AlternateContent xmlns:mc="http://schemas.openxmlformats.org/markup-compatibility/2006" xmlns:a14="http://schemas.microsoft.com/office/drawing/2010/main">
+        <mc:Choice Requires="a14">
           <p:sp>
             <p:nvSpPr>
               <p:cNvPr id="55" name="TextBox 54">
@@ -5866,7 +5866,7 @@
             </p:txBody>
           </p:sp>
         </mc:Choice>
-        <mc:Fallback>
+        <mc:Fallback xmlns="">
           <p:sp>
             <p:nvSpPr>
               <p:cNvPr id="55" name="TextBox 54">
@@ -5911,8 +5911,8 @@
           </p:sp>
         </mc:Fallback>
       </mc:AlternateContent>
-      <mc:AlternateContent xmlns:mc="http://schemas.openxmlformats.org/markup-compatibility/2006">
-        <mc:Choice xmlns:a14="http://schemas.microsoft.com/office/drawing/2010/main" Requires="a14">
+      <mc:AlternateContent xmlns:mc="http://schemas.openxmlformats.org/markup-compatibility/2006" xmlns:a14="http://schemas.microsoft.com/office/drawing/2010/main">
+        <mc:Choice Requires="a14">
           <p:sp>
             <p:nvSpPr>
               <p:cNvPr id="56" name="TextBox 55">
@@ -5981,7 +5981,7 @@
             </p:txBody>
           </p:sp>
         </mc:Choice>
-        <mc:Fallback>
+        <mc:Fallback xmlns="">
           <p:sp>
             <p:nvSpPr>
               <p:cNvPr id="56" name="TextBox 55">
@@ -6444,8 +6444,8 @@
           </a:p>
         </p:txBody>
       </p:sp>
-      <mc:AlternateContent xmlns:mc="http://schemas.openxmlformats.org/markup-compatibility/2006">
-        <mc:Choice xmlns:a14="http://schemas.microsoft.com/office/drawing/2010/main" Requires="a14">
+      <mc:AlternateContent xmlns:mc="http://schemas.openxmlformats.org/markup-compatibility/2006" xmlns:a14="http://schemas.microsoft.com/office/drawing/2010/main">
+        <mc:Choice Requires="a14">
           <p:sp>
             <p:nvSpPr>
               <p:cNvPr id="102" name="TextBox 101">
@@ -6514,7 +6514,7 @@
             </p:txBody>
           </p:sp>
         </mc:Choice>
-        <mc:Fallback>
+        <mc:Fallback xmlns="">
           <p:sp>
             <p:nvSpPr>
               <p:cNvPr id="102" name="TextBox 101">
@@ -6559,8 +6559,8 @@
           </p:sp>
         </mc:Fallback>
       </mc:AlternateContent>
-      <mc:AlternateContent xmlns:mc="http://schemas.openxmlformats.org/markup-compatibility/2006">
-        <mc:Choice xmlns:a14="http://schemas.microsoft.com/office/drawing/2010/main" Requires="a14">
+      <mc:AlternateContent xmlns:mc="http://schemas.openxmlformats.org/markup-compatibility/2006" xmlns:a14="http://schemas.microsoft.com/office/drawing/2010/main">
+        <mc:Choice Requires="a14">
           <p:sp>
             <p:nvSpPr>
               <p:cNvPr id="103" name="TextBox 102">
@@ -6629,7 +6629,7 @@
             </p:txBody>
           </p:sp>
         </mc:Choice>
-        <mc:Fallback>
+        <mc:Fallback xmlns="">
           <p:sp>
             <p:nvSpPr>
               <p:cNvPr id="103" name="TextBox 102">
@@ -6728,8 +6728,8 @@
           </a:p>
         </p:txBody>
       </p:sp>
-      <mc:AlternateContent xmlns:mc="http://schemas.openxmlformats.org/markup-compatibility/2006">
-        <mc:Choice xmlns:a14="http://schemas.microsoft.com/office/drawing/2010/main" Requires="a14">
+      <mc:AlternateContent xmlns:mc="http://schemas.openxmlformats.org/markup-compatibility/2006" xmlns:a14="http://schemas.microsoft.com/office/drawing/2010/main">
+        <mc:Choice Requires="a14">
           <p:sp>
             <p:nvSpPr>
               <p:cNvPr id="105" name="TextBox 104">
@@ -6837,7 +6837,7 @@
             </p:txBody>
           </p:sp>
         </mc:Choice>
-        <mc:Fallback>
+        <mc:Fallback xmlns="">
           <p:sp>
             <p:nvSpPr>
               <p:cNvPr id="105" name="TextBox 104">
@@ -6936,8 +6936,8 @@
           </a:p>
         </p:txBody>
       </p:sp>
-      <mc:AlternateContent xmlns:mc="http://schemas.openxmlformats.org/markup-compatibility/2006">
-        <mc:Choice xmlns:a14="http://schemas.microsoft.com/office/drawing/2010/main" Requires="a14">
+      <mc:AlternateContent xmlns:mc="http://schemas.openxmlformats.org/markup-compatibility/2006" xmlns:a14="http://schemas.microsoft.com/office/drawing/2010/main">
+        <mc:Choice Requires="a14">
           <p:sp>
             <p:nvSpPr>
               <p:cNvPr id="107" name="TextBox 106">
@@ -7077,7 +7077,7 @@
             </p:txBody>
           </p:sp>
         </mc:Choice>
-        <mc:Fallback>
+        <mc:Fallback xmlns="">
           <p:sp>
             <p:nvSpPr>
               <p:cNvPr id="107" name="TextBox 106">
@@ -7771,6 +7771,9 @@
             <a:avLst/>
           </a:prstGeom>
           <a:ln w="19050">
+            <a:solidFill>
+              <a:srgbClr val="C00000"/>
+            </a:solidFill>
             <a:tailEnd type="triangle"/>
           </a:ln>
         </p:spPr>
@@ -8467,6 +8470,9 @@
             <a:avLst/>
           </a:prstGeom>
           <a:ln w="19050">
+            <a:solidFill>
+              <a:srgbClr val="C00000"/>
+            </a:solidFill>
             <a:tailEnd type="triangle"/>
           </a:ln>
         </p:spPr>
@@ -8683,7 +8689,7 @@
           </a:prstGeom>
           <a:ln w="19050">
             <a:solidFill>
-              <a:srgbClr val="C00000"/>
+              <a:srgbClr val="0070C0"/>
             </a:solidFill>
             <a:tailEnd type="triangle"/>
           </a:ln>
@@ -8770,7 +8776,7 @@
           </a:prstGeom>
           <a:ln w="19050">
             <a:solidFill>
-              <a:srgbClr val="C00000"/>
+              <a:srgbClr val="0070C0"/>
             </a:solidFill>
             <a:tailEnd type="triangle"/>
           </a:ln>

</xml_diff>